<commit_message>
CoilDesign\\DEXTER_WORKSPACE: Updated .ppt with values
</commit_message>
<xml_diff>
--- a/CoilDesign/DEXTER_WORKSPACE/Comparison Table.pptx
+++ b/CoilDesign/DEXTER_WORKSPACE/Comparison Table.pptx
@@ -138,6 +138,143 @@
     </p:ext>
   </p:extLst>
 </p:presentation>
+</file>
+
+<file path=ppt/changesInfos/changesInfo1.xml><?xml version="1.0" encoding="utf-8"?>
+<pc:chgInfo xmlns:a="http://schemas.openxmlformats.org/drawingml/2006/main" xmlns:r="http://schemas.openxmlformats.org/officeDocument/2006/relationships" xmlns:ac="http://schemas.microsoft.com/office/drawing/2013/main/command" xmlns:pc="http://schemas.microsoft.com/office/powerpoint/2013/main/command">
+  <pc:docChgLst>
+    <pc:chgData name="nhatduy phamviet" userId="52957697aad046c3" providerId="LiveId" clId="{A1EFAE81-A8A8-4BB1-A779-D3AE1F659E8E}"/>
+    <pc:docChg chg="modMainMaster">
+      <pc:chgData name="nhatduy phamviet" userId="52957697aad046c3" providerId="LiveId" clId="{A1EFAE81-A8A8-4BB1-A779-D3AE1F659E8E}" dt="2021-01-24T09:44:31.774" v="69" actId="20577"/>
+      <pc:docMkLst>
+        <pc:docMk/>
+      </pc:docMkLst>
+      <pc:sldMasterChg chg="modSldLayout">
+        <pc:chgData name="nhatduy phamviet" userId="52957697aad046c3" providerId="LiveId" clId="{A1EFAE81-A8A8-4BB1-A779-D3AE1F659E8E}" dt="2021-01-24T09:44:31.774" v="69" actId="20577"/>
+        <pc:sldMasterMkLst>
+          <pc:docMk/>
+          <pc:sldMasterMk cId="697417937" sldId="2147483648"/>
+        </pc:sldMasterMkLst>
+        <pc:sldLayoutChg chg="modSp mod">
+          <pc:chgData name="nhatduy phamviet" userId="52957697aad046c3" providerId="LiveId" clId="{A1EFAE81-A8A8-4BB1-A779-D3AE1F659E8E}" dt="2021-01-24T09:44:31.774" v="69" actId="20577"/>
+          <pc:sldLayoutMkLst>
+            <pc:docMk/>
+            <pc:sldMasterMk cId="697417937" sldId="2147483648"/>
+            <pc:sldLayoutMk cId="3198831892" sldId="2147483669"/>
+          </pc:sldLayoutMkLst>
+          <pc:spChg chg="mod">
+            <ac:chgData name="nhatduy phamviet" userId="52957697aad046c3" providerId="LiveId" clId="{A1EFAE81-A8A8-4BB1-A779-D3AE1F659E8E}" dt="2021-01-24T09:00:15.285" v="25" actId="20577"/>
+            <ac:spMkLst>
+              <pc:docMk/>
+              <pc:sldMasterMk cId="697417937" sldId="2147483648"/>
+              <pc:sldLayoutMk cId="3198831892" sldId="2147483669"/>
+              <ac:spMk id="16" creationId="{00000000-0000-0000-0000-000000000000}"/>
+            </ac:spMkLst>
+          </pc:spChg>
+          <pc:spChg chg="mod">
+            <ac:chgData name="nhatduy phamviet" userId="52957697aad046c3" providerId="LiveId" clId="{A1EFAE81-A8A8-4BB1-A779-D3AE1F659E8E}" dt="2021-01-24T09:03:58.788" v="46" actId="122"/>
+            <ac:spMkLst>
+              <pc:docMk/>
+              <pc:sldMasterMk cId="697417937" sldId="2147483648"/>
+              <pc:sldLayoutMk cId="3198831892" sldId="2147483669"/>
+              <ac:spMk id="17" creationId="{00000000-0000-0000-0000-000000000000}"/>
+            </ac:spMkLst>
+          </pc:spChg>
+          <pc:spChg chg="mod">
+            <ac:chgData name="nhatduy phamviet" userId="52957697aad046c3" providerId="LiveId" clId="{A1EFAE81-A8A8-4BB1-A779-D3AE1F659E8E}" dt="2021-01-24T09:35:16.367" v="65" actId="122"/>
+            <ac:spMkLst>
+              <pc:docMk/>
+              <pc:sldMasterMk cId="697417937" sldId="2147483648"/>
+              <pc:sldLayoutMk cId="3198831892" sldId="2147483669"/>
+              <ac:spMk id="18" creationId="{00000000-0000-0000-0000-000000000000}"/>
+            </ac:spMkLst>
+          </pc:spChg>
+          <pc:spChg chg="mod">
+            <ac:chgData name="nhatduy phamviet" userId="52957697aad046c3" providerId="LiveId" clId="{A1EFAE81-A8A8-4BB1-A779-D3AE1F659E8E}" dt="2021-01-24T08:48:49.907" v="5" actId="20577"/>
+            <ac:spMkLst>
+              <pc:docMk/>
+              <pc:sldMasterMk cId="697417937" sldId="2147483648"/>
+              <pc:sldLayoutMk cId="3198831892" sldId="2147483669"/>
+              <ac:spMk id="21" creationId="{00000000-0000-0000-0000-000000000000}"/>
+            </ac:spMkLst>
+          </pc:spChg>
+          <pc:spChg chg="mod">
+            <ac:chgData name="nhatduy phamviet" userId="52957697aad046c3" providerId="LiveId" clId="{A1EFAE81-A8A8-4BB1-A779-D3AE1F659E8E}" dt="2021-01-24T09:02:28.363" v="35" actId="20577"/>
+            <ac:spMkLst>
+              <pc:docMk/>
+              <pc:sldMasterMk cId="697417937" sldId="2147483648"/>
+              <pc:sldLayoutMk cId="3198831892" sldId="2147483669"/>
+              <ac:spMk id="22" creationId="{00000000-0000-0000-0000-000000000000}"/>
+            </ac:spMkLst>
+          </pc:spChg>
+          <pc:spChg chg="mod">
+            <ac:chgData name="nhatduy phamviet" userId="52957697aad046c3" providerId="LiveId" clId="{A1EFAE81-A8A8-4BB1-A779-D3AE1F659E8E}" dt="2021-01-24T09:06:28.397" v="54" actId="20577"/>
+            <ac:spMkLst>
+              <pc:docMk/>
+              <pc:sldMasterMk cId="697417937" sldId="2147483648"/>
+              <pc:sldLayoutMk cId="3198831892" sldId="2147483669"/>
+              <ac:spMk id="23" creationId="{00000000-0000-0000-0000-000000000000}"/>
+            </ac:spMkLst>
+          </pc:spChg>
+          <pc:spChg chg="mod">
+            <ac:chgData name="nhatduy phamviet" userId="52957697aad046c3" providerId="LiveId" clId="{A1EFAE81-A8A8-4BB1-A779-D3AE1F659E8E}" dt="2021-01-24T08:49:25.154" v="12" actId="20577"/>
+            <ac:spMkLst>
+              <pc:docMk/>
+              <pc:sldMasterMk cId="697417937" sldId="2147483648"/>
+              <pc:sldLayoutMk cId="3198831892" sldId="2147483669"/>
+              <ac:spMk id="26" creationId="{00000000-0000-0000-0000-000000000000}"/>
+            </ac:spMkLst>
+          </pc:spChg>
+          <pc:spChg chg="mod">
+            <ac:chgData name="nhatduy phamviet" userId="52957697aad046c3" providerId="LiveId" clId="{A1EFAE81-A8A8-4BB1-A779-D3AE1F659E8E}" dt="2021-01-24T09:02:40.447" v="41" actId="20577"/>
+            <ac:spMkLst>
+              <pc:docMk/>
+              <pc:sldMasterMk cId="697417937" sldId="2147483648"/>
+              <pc:sldLayoutMk cId="3198831892" sldId="2147483669"/>
+              <ac:spMk id="27" creationId="{00000000-0000-0000-0000-000000000000}"/>
+            </ac:spMkLst>
+          </pc:spChg>
+          <pc:spChg chg="mod">
+            <ac:chgData name="nhatduy phamviet" userId="52957697aad046c3" providerId="LiveId" clId="{A1EFAE81-A8A8-4BB1-A779-D3AE1F659E8E}" dt="2021-01-24T09:06:42.718" v="60" actId="20577"/>
+            <ac:spMkLst>
+              <pc:docMk/>
+              <pc:sldMasterMk cId="697417937" sldId="2147483648"/>
+              <pc:sldLayoutMk cId="3198831892" sldId="2147483669"/>
+              <ac:spMk id="28" creationId="{00000000-0000-0000-0000-000000000000}"/>
+            </ac:spMkLst>
+          </pc:spChg>
+          <pc:spChg chg="mod">
+            <ac:chgData name="nhatduy phamviet" userId="52957697aad046c3" providerId="LiveId" clId="{A1EFAE81-A8A8-4BB1-A779-D3AE1F659E8E}" dt="2021-01-24T09:00:14.330" v="24" actId="20577"/>
+            <ac:spMkLst>
+              <pc:docMk/>
+              <pc:sldMasterMk cId="697417937" sldId="2147483648"/>
+              <pc:sldLayoutMk cId="3198831892" sldId="2147483669"/>
+              <ac:spMk id="31" creationId="{00000000-0000-0000-0000-000000000000}"/>
+            </ac:spMkLst>
+          </pc:spChg>
+          <pc:spChg chg="mod">
+            <ac:chgData name="nhatduy phamviet" userId="52957697aad046c3" providerId="LiveId" clId="{A1EFAE81-A8A8-4BB1-A779-D3AE1F659E8E}" dt="2021-01-24T09:02:21.744" v="29" actId="20577"/>
+            <ac:spMkLst>
+              <pc:docMk/>
+              <pc:sldMasterMk cId="697417937" sldId="2147483648"/>
+              <pc:sldLayoutMk cId="3198831892" sldId="2147483669"/>
+              <ac:spMk id="96" creationId="{00000000-0000-0000-0000-000000000000}"/>
+            </ac:spMkLst>
+          </pc:spChg>
+          <pc:spChg chg="mod">
+            <ac:chgData name="nhatduy phamviet" userId="52957697aad046c3" providerId="LiveId" clId="{A1EFAE81-A8A8-4BB1-A779-D3AE1F659E8E}" dt="2021-01-24T09:44:31.774" v="69" actId="20577"/>
+            <ac:spMkLst>
+              <pc:docMk/>
+              <pc:sldMasterMk cId="697417937" sldId="2147483648"/>
+              <pc:sldLayoutMk cId="3198831892" sldId="2147483669"/>
+              <ac:spMk id="97" creationId="{00000000-0000-0000-0000-000000000000}"/>
+            </ac:spMkLst>
+          </pc:spChg>
+        </pc:sldLayoutChg>
+      </pc:sldMasterChg>
+    </pc:docChg>
+  </pc:docChgLst>
+</pc:chgInfo>
 </file>
 
 <file path=ppt/handoutMasters/handoutMaster1.xml><?xml version="1.0" encoding="utf-8"?>
@@ -693,7 +830,11 @@
             </a:bodyPr>
             <a:lstStyle/>
             <a:p>
-              <a:endParaRPr lang="en-US"/>
+              <a:pPr algn="ctr"/>
+              <a:r>
+                <a:rPr lang="en-US" dirty="0"/>
+                <a:t>51 W</a:t>
+              </a:r>
             </a:p>
           </p:txBody>
         </p:sp>
@@ -740,7 +881,11 @@
             </a:bodyPr>
             <a:lstStyle/>
             <a:p>
-              <a:endParaRPr lang="en-US"/>
+              <a:pPr algn="ctr"/>
+              <a:r>
+                <a:rPr lang="en-US" dirty="0"/>
+                <a:t>53 W</a:t>
+              </a:r>
             </a:p>
           </p:txBody>
         </p:sp>
@@ -787,7 +932,11 @@
             </a:bodyPr>
             <a:lstStyle/>
             <a:p>
-              <a:endParaRPr lang="en-US"/>
+              <a:pPr algn="ctr"/>
+              <a:r>
+                <a:rPr lang="en-US" dirty="0"/>
+                <a:t>44 W</a:t>
+              </a:r>
             </a:p>
           </p:txBody>
         </p:sp>
@@ -932,7 +1081,10 @@
             <a:lstStyle/>
             <a:p>
               <a:pPr algn="ctr"/>
-              <a:endParaRPr lang="en-US" dirty="0"/>
+              <a:r>
+                <a:rPr lang="en-US" dirty="0"/>
+                <a:t>0.0598</a:t>
+              </a:r>
             </a:p>
           </p:txBody>
         </p:sp>
@@ -980,7 +1132,10 @@
             <a:lstStyle/>
             <a:p>
               <a:pPr algn="ctr"/>
-              <a:endParaRPr lang="en-US" dirty="0"/>
+              <a:r>
+                <a:rPr lang="en-US" dirty="0"/>
+                <a:t>0.0644</a:t>
+              </a:r>
             </a:p>
           </p:txBody>
         </p:sp>
@@ -1028,7 +1183,10 @@
             <a:lstStyle/>
             <a:p>
               <a:pPr algn="ctr"/>
-              <a:endParaRPr lang="en-US" dirty="0"/>
+              <a:r>
+                <a:rPr lang="en-US" dirty="0"/>
+                <a:t>0.0643</a:t>
+              </a:r>
             </a:p>
           </p:txBody>
         </p:sp>
@@ -1173,7 +1331,14 @@
             <a:lstStyle/>
             <a:p>
               <a:pPr algn="ctr"/>
-              <a:endParaRPr lang="en-US"/>
+              <a:r>
+                <a:rPr lang="en-US" dirty="0"/>
+                <a:t>0.1400</a:t>
+              </a:r>
+            </a:p>
+            <a:p>
+              <a:pPr algn="ctr"/>
+              <a:endParaRPr lang="en-US" dirty="0"/>
             </a:p>
           </p:txBody>
         </p:sp>
@@ -1221,7 +1386,10 @@
             <a:lstStyle/>
             <a:p>
               <a:pPr algn="ctr"/>
-              <a:endParaRPr lang="en-US"/>
+              <a:r>
+                <a:rPr lang="en-US" dirty="0"/>
+                <a:t>0.1390</a:t>
+              </a:r>
             </a:p>
           </p:txBody>
         </p:sp>
@@ -1269,7 +1437,10 @@
             <a:lstStyle/>
             <a:p>
               <a:pPr algn="ctr"/>
-              <a:endParaRPr lang="en-US" dirty="0"/>
+              <a:r>
+                <a:rPr lang="en-US" dirty="0"/>
+                <a:t>0.1252</a:t>
+              </a:r>
             </a:p>
           </p:txBody>
         </p:sp>
@@ -1414,7 +1585,10 @@
             <a:lstStyle/>
             <a:p>
               <a:pPr algn="ctr"/>
-              <a:endParaRPr lang="en-US"/>
+              <a:r>
+                <a:rPr lang="en-US" dirty="0"/>
+                <a:t>9 W</a:t>
+              </a:r>
             </a:p>
           </p:txBody>
         </p:sp>
@@ -1462,7 +1636,10 @@
             <a:lstStyle/>
             <a:p>
               <a:pPr algn="ctr"/>
-              <a:endParaRPr lang="en-US" dirty="0"/>
+              <a:r>
+                <a:rPr lang="en-US" dirty="0"/>
+                <a:t>11 W</a:t>
+              </a:r>
             </a:p>
           </p:txBody>
         </p:sp>
@@ -1510,7 +1687,10 @@
             <a:lstStyle/>
             <a:p>
               <a:pPr algn="ctr"/>
-              <a:endParaRPr lang="en-US" dirty="0"/>
+              <a:r>
+                <a:rPr lang="en-US" dirty="0"/>
+                <a:t>11 W</a:t>
+              </a:r>
             </a:p>
           </p:txBody>
         </p:sp>

</xml_diff>

<commit_message>
CoilDesign\\DEXTER_WORKSPACE: Edited .ppt table.
</commit_message>
<xml_diff>
--- a/CoilDesign/DEXTER_WORKSPACE/Comparison Table.pptx
+++ b/CoilDesign/DEXTER_WORKSPACE/Comparison Table.pptx
@@ -145,18 +145,18 @@
   <pc:docChgLst>
     <pc:chgData name="nhatduy phamviet" userId="52957697aad046c3" providerId="LiveId" clId="{A1EFAE81-A8A8-4BB1-A779-D3AE1F659E8E}"/>
     <pc:docChg chg="modMainMaster">
-      <pc:chgData name="nhatduy phamviet" userId="52957697aad046c3" providerId="LiveId" clId="{A1EFAE81-A8A8-4BB1-A779-D3AE1F659E8E}" dt="2021-01-24T09:44:31.774" v="69" actId="20577"/>
+      <pc:chgData name="nhatduy phamviet" userId="52957697aad046c3" providerId="LiveId" clId="{A1EFAE81-A8A8-4BB1-A779-D3AE1F659E8E}" dt="2021-01-24T22:32:16.071" v="72" actId="20577"/>
       <pc:docMkLst>
         <pc:docMk/>
       </pc:docMkLst>
       <pc:sldMasterChg chg="modSldLayout">
-        <pc:chgData name="nhatduy phamviet" userId="52957697aad046c3" providerId="LiveId" clId="{A1EFAE81-A8A8-4BB1-A779-D3AE1F659E8E}" dt="2021-01-24T09:44:31.774" v="69" actId="20577"/>
+        <pc:chgData name="nhatduy phamviet" userId="52957697aad046c3" providerId="LiveId" clId="{A1EFAE81-A8A8-4BB1-A779-D3AE1F659E8E}" dt="2021-01-24T22:32:16.071" v="72" actId="20577"/>
         <pc:sldMasterMkLst>
           <pc:docMk/>
           <pc:sldMasterMk cId="697417937" sldId="2147483648"/>
         </pc:sldMasterMkLst>
         <pc:sldLayoutChg chg="modSp mod">
-          <pc:chgData name="nhatduy phamviet" userId="52957697aad046c3" providerId="LiveId" clId="{A1EFAE81-A8A8-4BB1-A779-D3AE1F659E8E}" dt="2021-01-24T09:44:31.774" v="69" actId="20577"/>
+          <pc:chgData name="nhatduy phamviet" userId="52957697aad046c3" providerId="LiveId" clId="{A1EFAE81-A8A8-4BB1-A779-D3AE1F659E8E}" dt="2021-01-24T22:32:16.071" v="72" actId="20577"/>
           <pc:sldLayoutMkLst>
             <pc:docMk/>
             <pc:sldMasterMk cId="697417937" sldId="2147483648"/>
@@ -181,7 +181,7 @@
             </ac:spMkLst>
           </pc:spChg>
           <pc:spChg chg="mod">
-            <ac:chgData name="nhatduy phamviet" userId="52957697aad046c3" providerId="LiveId" clId="{A1EFAE81-A8A8-4BB1-A779-D3AE1F659E8E}" dt="2021-01-24T09:35:16.367" v="65" actId="122"/>
+            <ac:chgData name="nhatduy phamviet" userId="52957697aad046c3" providerId="LiveId" clId="{A1EFAE81-A8A8-4BB1-A779-D3AE1F659E8E}" dt="2021-01-24T22:32:06.666" v="70" actId="20577"/>
             <ac:spMkLst>
               <pc:docMk/>
               <pc:sldMasterMk cId="697417937" sldId="2147483648"/>
@@ -268,6 +268,15 @@
               <pc:sldMasterMk cId="697417937" sldId="2147483648"/>
               <pc:sldLayoutMk cId="3198831892" sldId="2147483669"/>
               <ac:spMk id="97" creationId="{00000000-0000-0000-0000-000000000000}"/>
+            </ac:spMkLst>
+          </pc:spChg>
+          <pc:spChg chg="mod">
+            <ac:chgData name="nhatduy phamviet" userId="52957697aad046c3" providerId="LiveId" clId="{A1EFAE81-A8A8-4BB1-A779-D3AE1F659E8E}" dt="2021-01-24T22:32:16.071" v="72" actId="20577"/>
+            <ac:spMkLst>
+              <pc:docMk/>
+              <pc:sldMasterMk cId="697417937" sldId="2147483648"/>
+              <pc:sldLayoutMk cId="3198831892" sldId="2147483669"/>
+              <ac:spMk id="101" creationId="{00000000-0000-0000-0000-000000000000}"/>
             </ac:spMkLst>
           </pc:spChg>
         </pc:sldLayoutChg>
@@ -359,7 +368,7 @@
           <a:p>
             <a:fld id="{4AECD13F-9E93-4C57-A5BD-336347054114}" type="datetimeFigureOut">
               <a:rPr lang="en-US" smtClean="0"/>
-              <a:t>1/24/2021</a:t>
+              <a:t>1/25/2021</a:t>
             </a:fld>
             <a:endParaRPr lang="en-US"/>
           </a:p>
@@ -476,7 +485,7 @@
           <a:p>
             <a:fld id="{FFF30096-E2FA-4C53-8FFA-C198FACBBC31}" type="datetimeFigureOut">
               <a:rPr lang="en-US" noProof="0" smtClean="0"/>
-              <a:t>1/24/2021</a:t>
+              <a:t>1/25/2021</a:t>
             </a:fld>
             <a:endParaRPr lang="en-US" noProof="0" dirty="0"/>
           </a:p>
@@ -935,7 +944,7 @@
               <a:pPr algn="ctr"/>
               <a:r>
                 <a:rPr lang="en-US" dirty="0"/>
-                <a:t>44 W</a:t>
+                <a:t>*44 W</a:t>
               </a:r>
             </a:p>
           </p:txBody>
@@ -2178,7 +2187,7 @@
           <a:p>
             <a:fld id="{FFF30096-E2FA-4C53-8FFA-C198FACBBC31}" type="datetimeFigureOut">
               <a:rPr lang="en-US" noProof="0" smtClean="0"/>
-              <a:t>1/24/2021</a:t>
+              <a:t>1/25/2021</a:t>
             </a:fld>
             <a:endParaRPr lang="en-US" noProof="0" dirty="0"/>
           </a:p>
@@ -2397,7 +2406,7 @@
             <a:fld id="{FFF30096-E2FA-4C53-8FFA-C198FACBBC31}" type="datetimeFigureOut">
               <a:rPr lang="en-US" smtClean="0"/>
               <a:pPr/>
-              <a:t>1/24/2021</a:t>
+              <a:t>1/25/2021</a:t>
             </a:fld>
             <a:endParaRPr lang="en-US"/>
           </a:p>

</xml_diff>